<commit_message>
Updated the regression models
</commit_message>
<xml_diff>
--- a/Presentazione Progetto.pptx
+++ b/Presentazione Progetto.pptx
@@ -7713,14 +7713,16 @@
             <p:ph sz="half" idx="1"/>
           </p:nvPr>
         </p:nvSpPr>
-        <p:spPr/>
+        <p:spPr>
+          <a:noFill/>
+        </p:spPr>
         <p:txBody>
           <a:bodyPr rtlCol="0">
             <a:normAutofit/>
           </a:bodyPr>
           <a:lstStyle/>
           <a:p>
-            <a:pPr marL="0" indent="0" rtl="0">
+            <a:pPr marL="0" indent="0">
               <a:buNone/>
             </a:pPr>
             <a:r>
@@ -7729,31 +7731,11 @@
             </a:r>
             <a:r>
               <a:rPr lang="it-IT" b="1" dirty="0" err="1"/>
-              <a:t>LinearSVR</a:t>
-            </a:r>
-            <a:r>
-              <a:rPr lang="it-IT" b="1" dirty="0"/>
-              <a:t> </a:t>
+              <a:t>RandomForestRegressor</a:t>
             </a:r>
             <a:r>
               <a:rPr lang="it-IT" dirty="0"/>
-              <a:t>(Linear Support </a:t>
-            </a:r>
-            <a:r>
-              <a:rPr lang="it-IT" dirty="0" err="1"/>
-              <a:t>Vector</a:t>
-            </a:r>
-            <a:r>
-              <a:rPr lang="it-IT" dirty="0"/>
-              <a:t> </a:t>
-            </a:r>
-            <a:r>
-              <a:rPr lang="it-IT" dirty="0" err="1"/>
-              <a:t>Regression</a:t>
-            </a:r>
-            <a:r>
-              <a:rPr lang="it-IT" dirty="0"/>
-              <a:t>), contenuto nella libreria </a:t>
+              <a:t>, contenuto nella libreria </a:t>
             </a:r>
             <a:r>
               <a:rPr lang="it-IT" dirty="0" err="1"/>
@@ -7761,7 +7743,7 @@
             </a:r>
             <a:r>
               <a:rPr lang="it-IT" dirty="0"/>
-              <a:t> di Python, dedicata al machine learning, utilissima per operazioni come Classificazione, Regressione, Clustering, etc.</a:t>
+              <a:t>  di Python, dedicata al machine learning, utilissima per operazioni come Classificazione, Regressione, Clustering, etc.</a:t>
             </a:r>
             <a:br>
               <a:rPr lang="it-IT" dirty="0"/>
@@ -7771,15 +7753,7 @@
             </a:br>
             <a:r>
               <a:rPr lang="it-IT" dirty="0"/>
-              <a:t>Nel nostro caso, l’algoritmo </a:t>
-            </a:r>
-            <a:r>
-              <a:rPr lang="it-IT" dirty="0" err="1"/>
-              <a:t>LinearSVR</a:t>
-            </a:r>
-            <a:r>
-              <a:rPr lang="it-IT" dirty="0"/>
-              <a:t> si è dimostrato semplice da utilizzare, e nel complesso ha offerto risultati migliori rispetto ad altri algoritmi di regressione (es. </a:t>
+              <a:t>Nel nostro caso, l’algoritmo  si è dimostrato semplice da utilizzare, e nel complesso ha offerto risultati migliori rispetto ad altri algoritmi di regressione (es. </a:t>
             </a:r>
             <a:r>
               <a:rPr lang="it-IT" dirty="0" err="1"/>
@@ -7792,6 +7766,14 @@
             <a:r>
               <a:rPr lang="it-IT" dirty="0" err="1"/>
               <a:t>tree</a:t>
+            </a:r>
+            <a:r>
+              <a:rPr lang="it-IT" dirty="0"/>
+              <a:t> o </a:t>
+            </a:r>
+            <a:r>
+              <a:rPr lang="it-IT" dirty="0" err="1"/>
+              <a:t>linearSVR</a:t>
             </a:r>
             <a:r>
               <a:rPr lang="it-IT" dirty="0"/>
@@ -7873,10 +7855,10 @@
       </p:sp>
       <p:pic>
         <p:nvPicPr>
-          <p:cNvPr id="8" name="Immagine 7" descr="Immagine che contiene testo&#10;&#10;Descrizione generata automaticamente">
+          <p:cNvPr id="9" name="Immagine 8" descr="Immagine che contiene testo&#10;&#10;Descrizione generata automaticamente">
             <a:extLst>
               <a:ext uri="{FF2B5EF4-FFF2-40B4-BE49-F238E27FC236}">
-                <a16:creationId xmlns:a16="http://schemas.microsoft.com/office/drawing/2014/main" id="{C2475E48-970B-4DA8-B7EB-C3DCA0BC5A5B}"/>
+                <a16:creationId xmlns:a16="http://schemas.microsoft.com/office/drawing/2014/main" id="{2173D811-CE7B-4DF3-992E-D2C7AA45ED78}"/>
               </a:ext>
             </a:extLst>
           </p:cNvPr>
@@ -7893,8 +7875,8 @@
         </p:blipFill>
         <p:spPr>
           <a:xfrm>
-            <a:off x="6460682" y="2837217"/>
-            <a:ext cx="5186410" cy="1183565"/>
+            <a:off x="6263499" y="2443992"/>
+            <a:ext cx="5733629" cy="1970016"/>
           </a:xfrm>
           <a:prstGeom prst="rect">
             <a:avLst/>

</xml_diff>

<commit_message>
added kelbowvisualzer in test.py to determine the right k
</commit_message>
<xml_diff>
--- a/Presentazione Progetto.pptx
+++ b/Presentazione Progetto.pptx
@@ -5213,8 +5213,12 @@
           <a:p>
             <a:pPr rtl="0"/>
             <a:r>
+              <a:rPr lang="it-IT"/>
+              <a:t>Modello </a:t>
+            </a:r>
+            <a:r>
               <a:rPr lang="it-IT" dirty="0"/>
-              <a:t>Algoritmo di </a:t>
+              <a:t>di </a:t>
             </a:r>
             <a:r>
               <a:rPr lang="it-IT" dirty="0" err="1"/>
@@ -7510,7 +7514,15 @@
             </a:br>
             <a:r>
               <a:rPr lang="it-IT" dirty="0"/>
-              <a:t>Il sistema attraverso un algoritmo di regressione SVR, calcola le emissioni previste per un’automobile con le caratteristiche in input.</a:t>
+              <a:t>Il sistema attraverso un algoritmo di regressione, il </a:t>
+            </a:r>
+            <a:r>
+              <a:rPr lang="it-IT" b="1" dirty="0" err="1"/>
+              <a:t>RandomForestRegressor</a:t>
+            </a:r>
+            <a:r>
+              <a:rPr lang="it-IT" dirty="0"/>
+              <a:t>, calcola le emissioni previste per un’automobile con le caratteristiche in input.</a:t>
             </a:r>
           </a:p>
           <a:p>
@@ -7715,7 +7727,7 @@
             <a:pPr rtl="0"/>
             <a:r>
               <a:rPr lang="it-IT" dirty="0"/>
-              <a:t>Algoritmo di Regressione</a:t>
+              <a:t>Modello di Regressione</a:t>
             </a:r>
           </a:p>
         </p:txBody>
@@ -7787,15 +7799,7 @@
             </a:br>
             <a:r>
               <a:rPr lang="it-IT" dirty="0"/>
-              <a:t>Nel nostro caso, l’algoritmo  si è dimostrato semplice da utilizzare, e nel complesso ha offerto risultati migliori rispetto ad altri algoritmi </a:t>
-            </a:r>
-            <a:r>
-              <a:rPr lang="it-IT"/>
-              <a:t>di regressione (</a:t>
-            </a:r>
-            <a:r>
-              <a:rPr lang="it-IT" dirty="0"/>
-              <a:t>es. </a:t>
+              <a:t>Nel nostro caso, l’algoritmo  si è dimostrato semplice da utilizzare, e nel complesso ha offerto risultati migliori rispetto ad altri algoritmi di regressione (es. </a:t>
             </a:r>
             <a:r>
               <a:rPr lang="it-IT" dirty="0" err="1"/>

</xml_diff>